<commit_message>
Ajuste na descritiva discreta e no slide
</commit_message>
<xml_diff>
--- a/FOX STATISTICS slides.pptx
+++ b/FOX STATISTICS slides.pptx
@@ -121,6 +121,9 @@
           </p14:sldIdLst>
         </p14:section>
       </p14:sectionLst>
+    </p:ext>
+    <p:ext uri="{EFAFB233-063F-42B5-8137-9DF3F51BA10A}">
+      <p15:sldGuideLst xmlns:p15="http://schemas.microsoft.com/office/powerpoint/2012/main"/>
     </p:ext>
   </p:extLst>
 </p:presentation>
@@ -848,7 +851,7 @@
           <a:p>
             <a:fld id="{575E5C18-A28A-4C6B-AA2F-A0579FFACB8C}" type="datetimeFigureOut">
               <a:rPr lang="pt-BR" smtClean="0"/>
-              <a:t>25/11/2019</a:t>
+              <a:t>26/11/2019</a:t>
             </a:fld>
             <a:endParaRPr lang="pt-BR"/>
           </a:p>
@@ -1099,7 +1102,7 @@
           <a:p>
             <a:fld id="{575E5C18-A28A-4C6B-AA2F-A0579FFACB8C}" type="datetimeFigureOut">
               <a:rPr lang="pt-BR" smtClean="0"/>
-              <a:t>25/11/2019</a:t>
+              <a:t>26/11/2019</a:t>
             </a:fld>
             <a:endParaRPr lang="pt-BR"/>
           </a:p>
@@ -1413,7 +1416,7 @@
           <a:p>
             <a:fld id="{575E5C18-A28A-4C6B-AA2F-A0579FFACB8C}" type="datetimeFigureOut">
               <a:rPr lang="pt-BR" smtClean="0"/>
-              <a:t>25/11/2019</a:t>
+              <a:t>26/11/2019</a:t>
             </a:fld>
             <a:endParaRPr lang="pt-BR"/>
           </a:p>
@@ -1754,7 +1757,7 @@
           <a:p>
             <a:fld id="{575E5C18-A28A-4C6B-AA2F-A0579FFACB8C}" type="datetimeFigureOut">
               <a:rPr lang="pt-BR" smtClean="0"/>
-              <a:t>25/11/2019</a:t>
+              <a:t>26/11/2019</a:t>
             </a:fld>
             <a:endParaRPr lang="pt-BR"/>
           </a:p>
@@ -2068,7 +2071,7 @@
           <a:p>
             <a:fld id="{575E5C18-A28A-4C6B-AA2F-A0579FFACB8C}" type="datetimeFigureOut">
               <a:rPr lang="pt-BR" smtClean="0"/>
-              <a:t>25/11/2019</a:t>
+              <a:t>26/11/2019</a:t>
             </a:fld>
             <a:endParaRPr lang="pt-BR"/>
           </a:p>
@@ -2461,7 +2464,7 @@
           <a:p>
             <a:fld id="{575E5C18-A28A-4C6B-AA2F-A0579FFACB8C}" type="datetimeFigureOut">
               <a:rPr lang="pt-BR" smtClean="0"/>
-              <a:t>25/11/2019</a:t>
+              <a:t>26/11/2019</a:t>
             </a:fld>
             <a:endParaRPr lang="pt-BR"/>
           </a:p>
@@ -2631,7 +2634,7 @@
           <a:p>
             <a:fld id="{575E5C18-A28A-4C6B-AA2F-A0579FFACB8C}" type="datetimeFigureOut">
               <a:rPr lang="pt-BR" smtClean="0"/>
-              <a:t>25/11/2019</a:t>
+              <a:t>26/11/2019</a:t>
             </a:fld>
             <a:endParaRPr lang="pt-BR"/>
           </a:p>
@@ -2811,7 +2814,7 @@
           <a:p>
             <a:fld id="{575E5C18-A28A-4C6B-AA2F-A0579FFACB8C}" type="datetimeFigureOut">
               <a:rPr lang="pt-BR" smtClean="0"/>
-              <a:t>25/11/2019</a:t>
+              <a:t>26/11/2019</a:t>
             </a:fld>
             <a:endParaRPr lang="pt-BR"/>
           </a:p>
@@ -2987,7 +2990,7 @@
           <a:p>
             <a:fld id="{575E5C18-A28A-4C6B-AA2F-A0579FFACB8C}" type="datetimeFigureOut">
               <a:rPr lang="pt-BR" smtClean="0"/>
-              <a:t>25/11/2019</a:t>
+              <a:t>26/11/2019</a:t>
             </a:fld>
             <a:endParaRPr lang="pt-BR"/>
           </a:p>
@@ -3234,7 +3237,7 @@
           <a:p>
             <a:fld id="{575E5C18-A28A-4C6B-AA2F-A0579FFACB8C}" type="datetimeFigureOut">
               <a:rPr lang="pt-BR" smtClean="0"/>
-              <a:t>25/11/2019</a:t>
+              <a:t>26/11/2019</a:t>
             </a:fld>
             <a:endParaRPr lang="pt-BR"/>
           </a:p>
@@ -3466,7 +3469,7 @@
           <a:p>
             <a:fld id="{575E5C18-A28A-4C6B-AA2F-A0579FFACB8C}" type="datetimeFigureOut">
               <a:rPr lang="pt-BR" smtClean="0"/>
-              <a:t>25/11/2019</a:t>
+              <a:t>26/11/2019</a:t>
             </a:fld>
             <a:endParaRPr lang="pt-BR"/>
           </a:p>
@@ -3840,7 +3843,7 @@
           <a:p>
             <a:fld id="{575E5C18-A28A-4C6B-AA2F-A0579FFACB8C}" type="datetimeFigureOut">
               <a:rPr lang="pt-BR" smtClean="0"/>
-              <a:t>25/11/2019</a:t>
+              <a:t>26/11/2019</a:t>
             </a:fld>
             <a:endParaRPr lang="pt-BR"/>
           </a:p>
@@ -3963,7 +3966,7 @@
           <a:p>
             <a:fld id="{575E5C18-A28A-4C6B-AA2F-A0579FFACB8C}" type="datetimeFigureOut">
               <a:rPr lang="pt-BR" smtClean="0"/>
-              <a:t>25/11/2019</a:t>
+              <a:t>26/11/2019</a:t>
             </a:fld>
             <a:endParaRPr lang="pt-BR"/>
           </a:p>
@@ -4058,7 +4061,7 @@
           <a:p>
             <a:fld id="{575E5C18-A28A-4C6B-AA2F-A0579FFACB8C}" type="datetimeFigureOut">
               <a:rPr lang="pt-BR" smtClean="0"/>
-              <a:t>25/11/2019</a:t>
+              <a:t>26/11/2019</a:t>
             </a:fld>
             <a:endParaRPr lang="pt-BR"/>
           </a:p>
@@ -4313,7 +4316,7 @@
           <a:p>
             <a:fld id="{575E5C18-A28A-4C6B-AA2F-A0579FFACB8C}" type="datetimeFigureOut">
               <a:rPr lang="pt-BR" smtClean="0"/>
-              <a:t>25/11/2019</a:t>
+              <a:t>26/11/2019</a:t>
             </a:fld>
             <a:endParaRPr lang="pt-BR"/>
           </a:p>
@@ -4576,7 +4579,7 @@
           <a:p>
             <a:fld id="{575E5C18-A28A-4C6B-AA2F-A0579FFACB8C}" type="datetimeFigureOut">
               <a:rPr lang="pt-BR" smtClean="0"/>
-              <a:t>25/11/2019</a:t>
+              <a:t>26/11/2019</a:t>
             </a:fld>
             <a:endParaRPr lang="pt-BR"/>
           </a:p>
@@ -5319,7 +5322,7 @@
           <a:p>
             <a:fld id="{575E5C18-A28A-4C6B-AA2F-A0579FFACB8C}" type="datetimeFigureOut">
               <a:rPr lang="pt-BR" smtClean="0"/>
-              <a:t>25/11/2019</a:t>
+              <a:t>26/11/2019</a:t>
             </a:fld>
             <a:endParaRPr lang="pt-BR"/>
           </a:p>
@@ -6087,7 +6090,7 @@
           <a:p>
             <a:r>
               <a:rPr lang="pt-BR" dirty="0"/>
-              <a:t>LINGUAGEM E BIBLIOTECA USADAS:</a:t>
+              <a:t>LINGUAGENS/BIBLIOTECAS USADAS:</a:t>
             </a:r>
           </a:p>
         </p:txBody>

</xml_diff>